<commit_message>
last updates before presentation
close https://github.com/OuhscBbmc/prairie-outpost/issues/731
</commit_message>
<xml_diff>
--- a/publications/presentation-2024-01-peds-residents-qi/crdw-2024-01.pptx
+++ b/publications/presentation-2024-01-peds-residents-qi/crdw-2024-01.pptx
@@ -5844,7 +5844,7 @@
           <a:p>
             <a:fld id="{074B6824-7023-4228-BB04-DF38B9F7BAD4}" type="datetimeFigureOut">
               <a:rPr lang="en-US" smtClean="0"/>
-              <a:t>1/22/2024</a:t>
+              <a:t>1/23/2024</a:t>
             </a:fld>
             <a:endParaRPr lang="en-US"/>
           </a:p>
@@ -8576,7 +8576,7 @@
           <a:p>
             <a:fld id="{48D8CAB9-F02B-405D-B26E-A393DAA55285}" type="datetimeFigureOut">
               <a:rPr lang="en-US" smtClean="0"/>
-              <a:t>1/22/2024</a:t>
+              <a:t>1/23/2024</a:t>
             </a:fld>
             <a:endParaRPr lang="en-US"/>
           </a:p>
@@ -8768,7 +8768,7 @@
           <a:p>
             <a:fld id="{48D8CAB9-F02B-405D-B26E-A393DAA55285}" type="datetimeFigureOut">
               <a:rPr lang="en-US" smtClean="0"/>
-              <a:t>1/22/2024</a:t>
+              <a:t>1/23/2024</a:t>
             </a:fld>
             <a:endParaRPr lang="en-US"/>
           </a:p>
@@ -8946,7 +8946,7 @@
           <a:p>
             <a:fld id="{48D8CAB9-F02B-405D-B26E-A393DAA55285}" type="datetimeFigureOut">
               <a:rPr lang="en-US" smtClean="0"/>
-              <a:t>1/22/2024</a:t>
+              <a:t>1/23/2024</a:t>
             </a:fld>
             <a:endParaRPr lang="en-US"/>
           </a:p>
@@ -9114,7 +9114,7 @@
           <a:p>
             <a:fld id="{48D8CAB9-F02B-405D-B26E-A393DAA55285}" type="datetimeFigureOut">
               <a:rPr lang="en-US" smtClean="0"/>
-              <a:t>1/22/2024</a:t>
+              <a:t>1/23/2024</a:t>
             </a:fld>
             <a:endParaRPr lang="en-US"/>
           </a:p>
@@ -9359,7 +9359,7 @@
           <a:p>
             <a:fld id="{48D8CAB9-F02B-405D-B26E-A393DAA55285}" type="datetimeFigureOut">
               <a:rPr lang="en-US" smtClean="0"/>
-              <a:t>1/22/2024</a:t>
+              <a:t>1/23/2024</a:t>
             </a:fld>
             <a:endParaRPr lang="en-US"/>
           </a:p>
@@ -9588,7 +9588,7 @@
           <a:p>
             <a:fld id="{48D8CAB9-F02B-405D-B26E-A393DAA55285}" type="datetimeFigureOut">
               <a:rPr lang="en-US" smtClean="0"/>
-              <a:t>1/22/2024</a:t>
+              <a:t>1/23/2024</a:t>
             </a:fld>
             <a:endParaRPr lang="en-US"/>
           </a:p>
@@ -9952,7 +9952,7 @@
           <a:p>
             <a:fld id="{48D8CAB9-F02B-405D-B26E-A393DAA55285}" type="datetimeFigureOut">
               <a:rPr lang="en-US" smtClean="0"/>
-              <a:t>1/22/2024</a:t>
+              <a:t>1/23/2024</a:t>
             </a:fld>
             <a:endParaRPr lang="en-US"/>
           </a:p>
@@ -10069,7 +10069,7 @@
           <a:p>
             <a:fld id="{48D8CAB9-F02B-405D-B26E-A393DAA55285}" type="datetimeFigureOut">
               <a:rPr lang="en-US" smtClean="0"/>
-              <a:t>1/22/2024</a:t>
+              <a:t>1/23/2024</a:t>
             </a:fld>
             <a:endParaRPr lang="en-US"/>
           </a:p>
@@ -10164,7 +10164,7 @@
           <a:p>
             <a:fld id="{48D8CAB9-F02B-405D-B26E-A393DAA55285}" type="datetimeFigureOut">
               <a:rPr lang="en-US" smtClean="0"/>
-              <a:t>1/22/2024</a:t>
+              <a:t>1/23/2024</a:t>
             </a:fld>
             <a:endParaRPr lang="en-US"/>
           </a:p>
@@ -10439,7 +10439,7 @@
           <a:p>
             <a:fld id="{48D8CAB9-F02B-405D-B26E-A393DAA55285}" type="datetimeFigureOut">
               <a:rPr lang="en-US" smtClean="0"/>
-              <a:t>1/22/2024</a:t>
+              <a:t>1/23/2024</a:t>
             </a:fld>
             <a:endParaRPr lang="en-US"/>
           </a:p>
@@ -10691,7 +10691,7 @@
           <a:p>
             <a:fld id="{48D8CAB9-F02B-405D-B26E-A393DAA55285}" type="datetimeFigureOut">
               <a:rPr lang="en-US" smtClean="0"/>
-              <a:t>1/22/2024</a:t>
+              <a:t>1/23/2024</a:t>
             </a:fld>
             <a:endParaRPr lang="en-US"/>
           </a:p>
@@ -10902,7 +10902,7 @@
           <a:p>
             <a:fld id="{48D8CAB9-F02B-405D-B26E-A393DAA55285}" type="datetimeFigureOut">
               <a:rPr lang="en-US" smtClean="0"/>
-              <a:t>1/22/2024</a:t>
+              <a:t>1/23/2024</a:t>
             </a:fld>
             <a:endParaRPr lang="en-US"/>
           </a:p>
@@ -13220,20 +13220,52 @@
                   <a:srgbClr val="000000"/>
                 </a:solidFill>
               </a:rPr>
-              <a:t>We sweep the code list and send you ~100 possibilities.</a:t>
-            </a:r>
-          </a:p>
-          <a:p>
-            <a:pPr marL="514350" indent="-514350">
-              <a:buAutoNum type="arabicPeriod"/>
-            </a:pPr>
+              <a:t>We </a:t>
+            </a:r>
+            <a:r>
+              <a:rPr lang="en-US" i="1" dirty="0">
+                <a:solidFill>
+                  <a:srgbClr val="000000"/>
+                </a:solidFill>
+              </a:rPr>
+              <a:t>sweep</a:t>
+            </a:r>
             <a:r>
               <a:rPr lang="en-US" dirty="0">
                 <a:solidFill>
                   <a:srgbClr val="000000"/>
                 </a:solidFill>
               </a:rPr>
-              <a:t>You specify the exact ~30 codes that reflect the inclusion criteria</a:t>
+              <a:t> the code list and send you ~100 possibilities.</a:t>
+            </a:r>
+          </a:p>
+          <a:p>
+            <a:pPr marL="514350" indent="-514350">
+              <a:buAutoNum type="arabicPeriod"/>
+            </a:pPr>
+            <a:r>
+              <a:rPr lang="en-US" dirty="0">
+                <a:solidFill>
+                  <a:srgbClr val="000000"/>
+                </a:solidFill>
+              </a:rPr>
+              <a:t>You </a:t>
+            </a:r>
+            <a:r>
+              <a:rPr lang="en-US" i="1" dirty="0">
+                <a:solidFill>
+                  <a:srgbClr val="000000"/>
+                </a:solidFill>
+              </a:rPr>
+              <a:t>specify</a:t>
+            </a:r>
+            <a:r>
+              <a:rPr lang="en-US" dirty="0">
+                <a:solidFill>
+                  <a:srgbClr val="000000"/>
+                </a:solidFill>
+              </a:rPr>
+              <a:t> the ~30 exact codes that reflect the inclusion criteria</a:t>
             </a:r>
           </a:p>
           <a:p>
@@ -13571,7 +13603,7 @@
         </p:spPr>
         <p:txBody>
           <a:bodyPr>
-            <a:normAutofit/>
+            <a:normAutofit fontScale="85000" lnSpcReduction="20000"/>
           </a:bodyPr>
           <a:lstStyle/>
           <a:p>
@@ -13584,6 +13616,18 @@
             <a:r>
               <a:rPr lang="en-US" sz="2200" dirty="0"/>
               <a:t>Ashley Thumann, MHA</a:t>
+            </a:r>
+          </a:p>
+          <a:p>
+            <a:r>
+              <a:rPr lang="en-US" sz="2200" dirty="0"/>
+              <a:t>Geneva Marshall, MS</a:t>
+            </a:r>
+          </a:p>
+          <a:p>
+            <a:r>
+              <a:rPr lang="en-US" sz="2200" dirty="0"/>
+              <a:t>Arnold Kanagwa, MS</a:t>
             </a:r>
           </a:p>
           <a:p>
@@ -31133,7 +31177,7 @@
         </p:spPr>
         <p:txBody>
           <a:bodyPr>
-            <a:normAutofit lnSpcReduction="10000"/>
+            <a:normAutofit/>
           </a:bodyPr>
           <a:lstStyle/>
           <a:p>
@@ -31200,30 +31244,13 @@
             </a:pPr>
             <a:r>
               <a:rPr lang="en-US" sz="2400" dirty="0"/>
-              <a:t>Medication Order</a:t>
-            </a:r>
-          </a:p>
-          <a:p>
-            <a:pPr marL="685800" lvl="2">
-              <a:spcBef>
-                <a:spcPts val="1000"/>
-              </a:spcBef>
-            </a:pPr>
-            <a:r>
-              <a:rPr lang="en-US" sz="2400" dirty="0"/>
-              <a:t>Procedure</a:t>
-            </a:r>
-          </a:p>
-          <a:p>
-            <a:pPr marL="685800" lvl="2">
-              <a:spcBef>
-                <a:spcPts val="1000"/>
-              </a:spcBef>
-            </a:pPr>
-            <a:r>
-              <a:rPr lang="en-US" sz="2400" dirty="0"/>
-              <a:t>Flowsheet</a:t>
-            </a:r>
+              <a:t>Medication </a:t>
+            </a:r>
+            <a:r>
+              <a:rPr lang="en-US" sz="2400" dirty="0" err="1"/>
+              <a:t>OrderFlowsheet</a:t>
+            </a:r>
+            <a:endParaRPr lang="en-US" sz="2400" dirty="0"/>
           </a:p>
           <a:p>
             <a:pPr marL="228600" lvl="1">
@@ -32503,8 +32530,8 @@
         </p:nvSpPr>
         <p:spPr>
           <a:xfrm>
-            <a:off x="10103314" y="365447"/>
-            <a:ext cx="1774620" cy="954107"/>
+            <a:off x="9718765" y="365447"/>
+            <a:ext cx="2307771" cy="1384995"/>
           </a:xfrm>
           <a:prstGeom prst="rect">
             <a:avLst/>
@@ -32532,8 +32559,21 @@
           <a:p>
             <a:r>
               <a:rPr lang="en-US" sz="2800" dirty="0"/>
-              <a:t>Then “Yes” to CRDW</a:t>
-            </a:r>
+              <a:t>Then “CRDW”</a:t>
+            </a:r>
+          </a:p>
+          <a:p>
+            <a:r>
+              <a:rPr lang="en-US" sz="2800" dirty="0"/>
+              <a:t>Service</a:t>
+            </a:r>
+          </a:p>
+          <a:p>
+            <a:r>
+              <a:rPr lang="en-US" sz="2800" dirty="0" err="1"/>
+              <a:t>Reuqested</a:t>
+            </a:r>
+            <a:endParaRPr lang="en-US" sz="2800" dirty="0"/>
           </a:p>
         </p:txBody>
       </p:sp>

</xml_diff>

<commit_message>
adding presentation for developmental peds
</commit_message>
<xml_diff>
--- a/publications/presentation-2024-01-peds-residents-qi/crdw-2024-01.pptx
+++ b/publications/presentation-2024-01-peds-residents-qi/crdw-2024-01.pptx
@@ -5844,7 +5844,7 @@
           <a:p>
             <a:fld id="{074B6824-7023-4228-BB04-DF38B9F7BAD4}" type="datetimeFigureOut">
               <a:rPr lang="en-US" smtClean="0"/>
-              <a:t>1/23/2024</a:t>
+              <a:t>5/10/2024</a:t>
             </a:fld>
             <a:endParaRPr lang="en-US"/>
           </a:p>
@@ -6479,15 +6479,7 @@
             </a:pPr>
             <a:r>
               <a:rPr lang="en-US" baseline="0" dirty="0"/>
-              <a:t>When a investigation is approved by the IRB, we can develop a tiny database in </a:t>
-            </a:r>
-            <a:r>
-              <a:rPr lang="en-US" baseline="0" dirty="0" err="1"/>
-              <a:t>REDCap</a:t>
-            </a:r>
-            <a:r>
-              <a:rPr lang="en-US" baseline="0" dirty="0"/>
-              <a:t> that contains the dataset needed for their analysis (5</a:t>
+              <a:t>When an investigation is approved by the IRB, we can develop a tiny database in REDCap that contains the dataset needed for their analysis (5</a:t>
             </a:r>
             <a:r>
               <a:rPr lang="en-US" baseline="30000" dirty="0"/>
@@ -8576,7 +8568,7 @@
           <a:p>
             <a:fld id="{48D8CAB9-F02B-405D-B26E-A393DAA55285}" type="datetimeFigureOut">
               <a:rPr lang="en-US" smtClean="0"/>
-              <a:t>1/23/2024</a:t>
+              <a:t>5/10/2024</a:t>
             </a:fld>
             <a:endParaRPr lang="en-US"/>
           </a:p>
@@ -8768,7 +8760,7 @@
           <a:p>
             <a:fld id="{48D8CAB9-F02B-405D-B26E-A393DAA55285}" type="datetimeFigureOut">
               <a:rPr lang="en-US" smtClean="0"/>
-              <a:t>1/23/2024</a:t>
+              <a:t>5/10/2024</a:t>
             </a:fld>
             <a:endParaRPr lang="en-US"/>
           </a:p>
@@ -8946,7 +8938,7 @@
           <a:p>
             <a:fld id="{48D8CAB9-F02B-405D-B26E-A393DAA55285}" type="datetimeFigureOut">
               <a:rPr lang="en-US" smtClean="0"/>
-              <a:t>1/23/2024</a:t>
+              <a:t>5/10/2024</a:t>
             </a:fld>
             <a:endParaRPr lang="en-US"/>
           </a:p>
@@ -9114,7 +9106,7 @@
           <a:p>
             <a:fld id="{48D8CAB9-F02B-405D-B26E-A393DAA55285}" type="datetimeFigureOut">
               <a:rPr lang="en-US" smtClean="0"/>
-              <a:t>1/23/2024</a:t>
+              <a:t>5/10/2024</a:t>
             </a:fld>
             <a:endParaRPr lang="en-US"/>
           </a:p>
@@ -9359,7 +9351,7 @@
           <a:p>
             <a:fld id="{48D8CAB9-F02B-405D-B26E-A393DAA55285}" type="datetimeFigureOut">
               <a:rPr lang="en-US" smtClean="0"/>
-              <a:t>1/23/2024</a:t>
+              <a:t>5/10/2024</a:t>
             </a:fld>
             <a:endParaRPr lang="en-US"/>
           </a:p>
@@ -9588,7 +9580,7 @@
           <a:p>
             <a:fld id="{48D8CAB9-F02B-405D-B26E-A393DAA55285}" type="datetimeFigureOut">
               <a:rPr lang="en-US" smtClean="0"/>
-              <a:t>1/23/2024</a:t>
+              <a:t>5/10/2024</a:t>
             </a:fld>
             <a:endParaRPr lang="en-US"/>
           </a:p>
@@ -9952,7 +9944,7 @@
           <a:p>
             <a:fld id="{48D8CAB9-F02B-405D-B26E-A393DAA55285}" type="datetimeFigureOut">
               <a:rPr lang="en-US" smtClean="0"/>
-              <a:t>1/23/2024</a:t>
+              <a:t>5/10/2024</a:t>
             </a:fld>
             <a:endParaRPr lang="en-US"/>
           </a:p>
@@ -10069,7 +10061,7 @@
           <a:p>
             <a:fld id="{48D8CAB9-F02B-405D-B26E-A393DAA55285}" type="datetimeFigureOut">
               <a:rPr lang="en-US" smtClean="0"/>
-              <a:t>1/23/2024</a:t>
+              <a:t>5/10/2024</a:t>
             </a:fld>
             <a:endParaRPr lang="en-US"/>
           </a:p>
@@ -10164,7 +10156,7 @@
           <a:p>
             <a:fld id="{48D8CAB9-F02B-405D-B26E-A393DAA55285}" type="datetimeFigureOut">
               <a:rPr lang="en-US" smtClean="0"/>
-              <a:t>1/23/2024</a:t>
+              <a:t>5/10/2024</a:t>
             </a:fld>
             <a:endParaRPr lang="en-US"/>
           </a:p>
@@ -10439,7 +10431,7 @@
           <a:p>
             <a:fld id="{48D8CAB9-F02B-405D-B26E-A393DAA55285}" type="datetimeFigureOut">
               <a:rPr lang="en-US" smtClean="0"/>
-              <a:t>1/23/2024</a:t>
+              <a:t>5/10/2024</a:t>
             </a:fld>
             <a:endParaRPr lang="en-US"/>
           </a:p>
@@ -10691,7 +10683,7 @@
           <a:p>
             <a:fld id="{48D8CAB9-F02B-405D-B26E-A393DAA55285}" type="datetimeFigureOut">
               <a:rPr lang="en-US" smtClean="0"/>
-              <a:t>1/23/2024</a:t>
+              <a:t>5/10/2024</a:t>
             </a:fld>
             <a:endParaRPr lang="en-US"/>
           </a:p>
@@ -10902,7 +10894,7 @@
           <a:p>
             <a:fld id="{48D8CAB9-F02B-405D-B26E-A393DAA55285}" type="datetimeFigureOut">
               <a:rPr lang="en-US" smtClean="0"/>
-              <a:t>1/23/2024</a:t>
+              <a:t>5/10/2024</a:t>
             </a:fld>
             <a:endParaRPr lang="en-US"/>
           </a:p>

</xml_diff>